<commit_message>
corrected incorrect type label for Patient.active (was HumanName)
</commit_message>
<xml_diff>
--- a/spec/treestructure.pptx
+++ b/spec/treestructure.pptx
@@ -104,6 +104,11 @@
       </a:defRPr>
     </a:lvl9pPr>
   </p:defaultTextStyle>
+  <p:extLst>
+    <p:ext uri="{EFAFB233-063F-42B5-8137-9DF3F51BA10A}">
+      <p15:sldGuideLst xmlns:p15="http://schemas.microsoft.com/office/powerpoint/2012/main"/>
+    </p:ext>
+  </p:extLst>
 </p:presentation>
 </file>
 
@@ -3036,11 +3041,6 @@
               </a:rPr>
               <a:t>(Patient)</a:t>
             </a:r>
-            <a:endParaRPr lang="en-US" sz="1200" i="1" dirty="0" smtClean="0">
-              <a:solidFill>
-                <a:schemeClr val="tx1"/>
-              </a:solidFill>
-            </a:endParaRPr>
           </a:p>
         </p:txBody>
       </p:sp>
@@ -3132,11 +3132,6 @@
               </a:rPr>
               <a:t>)</a:t>
             </a:r>
-            <a:endParaRPr lang="en-US" sz="1200" i="1" dirty="0" smtClean="0">
-              <a:solidFill>
-                <a:schemeClr val="tx1"/>
-              </a:solidFill>
-            </a:endParaRPr>
           </a:p>
         </p:txBody>
       </p:sp>
@@ -3228,11 +3223,6 @@
               </a:rPr>
               <a:t>)</a:t>
             </a:r>
-            <a:endParaRPr lang="en-US" sz="1200" i="1" dirty="0" smtClean="0">
-              <a:solidFill>
-                <a:schemeClr val="tx1"/>
-              </a:solidFill>
-            </a:endParaRPr>
           </a:p>
         </p:txBody>
       </p:sp>
@@ -3328,7 +3318,7 @@
                     <a:schemeClr val="tx1"/>
                   </a:solidFill>
                 </a:rPr>
-                <a:t>HumanName</a:t>
+                <a:t>boolean</a:t>
               </a:r>
               <a:r>
                 <a:rPr lang="en-US" sz="1200" i="1" dirty="0" smtClean="0">
@@ -3337,6 +3327,14 @@
                   </a:solidFill>
                 </a:rPr>
                 <a:t>)</a:t>
+              </a:r>
+              <a:r>
+                <a:rPr lang="en-US" sz="1200" i="1" dirty="0" smtClean="0">
+                  <a:solidFill>
+                    <a:schemeClr val="tx1"/>
+                  </a:solidFill>
+                </a:rPr>
+                <a:t/>
               </a:r>
               <a:br>
                 <a:rPr lang="en-US" sz="1200" i="1" dirty="0" smtClean="0">
@@ -3471,14 +3469,6 @@
                   </a:solidFill>
                 </a:rPr>
                 <a:t>use</a:t>
-              </a:r>
-              <a:r>
-                <a:rPr lang="en-US" b="1" dirty="0" smtClean="0">
-                  <a:solidFill>
-                    <a:schemeClr val="tx1"/>
-                  </a:solidFill>
-                </a:rPr>
-                <a:t/>
               </a:r>
               <a:br>
                 <a:rPr lang="en-US" b="1" dirty="0" smtClean="0">
@@ -3630,14 +3620,6 @@
                 </a:rPr>
                 <a:t>family</a:t>
               </a:r>
-              <a:r>
-                <a:rPr lang="en-US" b="1" dirty="0" smtClean="0">
-                  <a:solidFill>
-                    <a:schemeClr val="tx1"/>
-                  </a:solidFill>
-                </a:rPr>
-                <a:t/>
-              </a:r>
               <a:br>
                 <a:rPr lang="en-US" b="1" dirty="0" smtClean="0">
                   <a:solidFill>
@@ -3788,14 +3770,6 @@
                 </a:rPr>
                 <a:t>given</a:t>
               </a:r>
-              <a:r>
-                <a:rPr lang="en-US" b="1" dirty="0" smtClean="0">
-                  <a:solidFill>
-                    <a:schemeClr val="tx1"/>
-                  </a:solidFill>
-                </a:rPr>
-                <a:t/>
-              </a:r>
               <a:br>
                 <a:rPr lang="en-US" b="1" dirty="0" smtClean="0">
                   <a:solidFill>
@@ -3945,14 +3919,6 @@
                   </a:solidFill>
                 </a:rPr>
                 <a:t>given</a:t>
-              </a:r>
-              <a:r>
-                <a:rPr lang="en-US" b="1" dirty="0" smtClean="0">
-                  <a:solidFill>
-                    <a:schemeClr val="tx1"/>
-                  </a:solidFill>
-                </a:rPr>
-                <a:t/>
               </a:r>
               <a:br>
                 <a:rPr lang="en-US" b="1" dirty="0" smtClean="0">
@@ -4334,14 +4300,6 @@
                 </a:solidFill>
               </a:rPr>
               <a:t>value</a:t>
-            </a:r>
-            <a:r>
-              <a:rPr lang="en-US" b="1" dirty="0" smtClean="0">
-                <a:solidFill>
-                  <a:schemeClr val="tx1"/>
-                </a:solidFill>
-              </a:rPr>
-              <a:t/>
             </a:r>
             <a:br>
               <a:rPr lang="en-US" b="1" dirty="0" smtClean="0">
@@ -5168,6 +5126,13 @@
   <p:clrMapOvr>
     <a:masterClrMapping/>
   </p:clrMapOvr>
+  <p:timing>
+    <p:tnLst>
+      <p:par>
+        <p:cTn id="1" dur="indefinite" restart="never" nodeType="tmRoot"/>
+      </p:par>
+    </p:tnLst>
+  </p:timing>
 </p:sld>
 </file>
 

</xml_diff>